<commit_message>
A final fixed taken
Even may occur fianl changes
</commit_message>
<xml_diff>
--- a/Coursera IBM Cpastone Project Data Science.pptx
+++ b/Coursera IBM Cpastone Project Data Science.pptx
@@ -4099,10 +4099,10 @@
       </p:grpSpPr>
       <p:pic>
         <p:nvPicPr>
-          <p:cNvPr id="3" name="Picture 2">
-            <a:extLst>
-              <a:ext uri="{FF2B5EF4-FFF2-40B4-BE49-F238E27FC236}">
-                <a16:creationId xmlns:a16="http://schemas.microsoft.com/office/drawing/2014/main" id="{1F78C6B8-218B-4637-8437-CEC5570911C4}"/>
+          <p:cNvPr id="4" name="Picture 3">
+            <a:extLst>
+              <a:ext uri="{FF2B5EF4-FFF2-40B4-BE49-F238E27FC236}">
+                <a16:creationId xmlns:a16="http://schemas.microsoft.com/office/drawing/2014/main" id="{125C5E9E-6DE7-401A-B5F2-0D43E7054BAB}"/>
               </a:ext>
             </a:extLst>
           </p:cNvPr>
@@ -4119,14 +4119,136 @@
         </p:blipFill>
         <p:spPr>
           <a:xfrm>
-            <a:off x="0" y="1171576"/>
-            <a:ext cx="12192000" cy="4657724"/>
+            <a:off x="2512557" y="1100138"/>
+            <a:ext cx="6498093" cy="2328862"/>
           </a:xfrm>
           <a:prstGeom prst="rect">
             <a:avLst/>
           </a:prstGeom>
         </p:spPr>
       </p:pic>
+      <p:sp>
+        <p:nvSpPr>
+          <p:cNvPr id="5" name="TextBox 4">
+            <a:extLst>
+              <a:ext uri="{FF2B5EF4-FFF2-40B4-BE49-F238E27FC236}">
+                <a16:creationId xmlns:a16="http://schemas.microsoft.com/office/drawing/2014/main" id="{282D57F4-E66E-4B2F-8402-4F1162125DFC}"/>
+              </a:ext>
+            </a:extLst>
+          </p:cNvPr>
+          <p:cNvSpPr txBox="1"/>
+          <p:nvPr/>
+        </p:nvSpPr>
+        <p:spPr>
+          <a:xfrm>
+            <a:off x="2314574" y="3293616"/>
+            <a:ext cx="6287887" cy="3357650"/>
+          </a:xfrm>
+          <a:prstGeom prst="rect">
+            <a:avLst/>
+          </a:prstGeom>
+          <a:noFill/>
+        </p:spPr>
+        <p:txBody>
+          <a:bodyPr wrap="square" rtlCol="0">
+            <a:spAutoFit/>
+          </a:bodyPr>
+          <a:lstStyle/>
+          <a:p>
+            <a:pPr marL="0" marR="0">
+              <a:lnSpc>
+                <a:spcPts val="3000"/>
+              </a:lnSpc>
+              <a:spcBef>
+                <a:spcPts val="2340"/>
+              </a:spcBef>
+              <a:spcAft>
+                <a:spcPts val="0"/>
+              </a:spcAft>
+            </a:pPr>
+            <a:r>
+              <a:rPr lang="en-US" sz="1800" b="1" kern="1800" spc="-25">
+                <a:solidFill>
+                  <a:srgbClr val="292929"/>
+                </a:solidFill>
+                <a:effectLst/>
+                <a:latin typeface="Lucida Sans Unicode" panose="020B0602030504020204" pitchFamily="34" charset="0"/>
+                <a:ea typeface="Times New Roman" panose="02020603050405020304" pitchFamily="18" charset="0"/>
+                <a:cs typeface="Times New Roman" panose="02020603050405020304" pitchFamily="18" charset="0"/>
+              </a:rPr>
+              <a:t>Conclusion</a:t>
+            </a:r>
+            <a:endParaRPr lang="en-US" sz="1800">
+              <a:effectLst/>
+              <a:latin typeface="Calibri" panose="020F0502020204030204" pitchFamily="34" charset="0"/>
+              <a:ea typeface="Calibri" panose="020F0502020204030204" pitchFamily="34" charset="0"/>
+              <a:cs typeface="Times New Roman" panose="02020603050405020304" pitchFamily="18" charset="0"/>
+            </a:endParaRPr>
+          </a:p>
+          <a:p>
+            <a:pPr marL="0" marR="0">
+              <a:lnSpc>
+                <a:spcPts val="2400"/>
+              </a:lnSpc>
+              <a:spcBef>
+                <a:spcPts val="1030"/>
+              </a:spcBef>
+              <a:spcAft>
+                <a:spcPts val="0"/>
+              </a:spcAft>
+            </a:pPr>
+            <a:r>
+              <a:rPr lang="en-US" sz="1800" spc="-5">
+                <a:solidFill>
+                  <a:srgbClr val="292929"/>
+                </a:solidFill>
+                <a:effectLst/>
+                <a:latin typeface="Georgia" panose="02040502050405020303" pitchFamily="18" charset="0"/>
+                <a:ea typeface="Times New Roman" panose="02020603050405020304" pitchFamily="18" charset="0"/>
+                <a:cs typeface="Times New Roman" panose="02020603050405020304" pitchFamily="18" charset="0"/>
+              </a:rPr>
+              <a:t>According to data, weather conditions have a certain impact as variable to conduct on accident, also if occurs will be more likely to result on property damage (class 1) or injury (class 2) and not fatal losses.</a:t>
+            </a:r>
+            <a:endParaRPr lang="en-US" sz="1800">
+              <a:effectLst/>
+              <a:latin typeface="Calibri" panose="020F0502020204030204" pitchFamily="34" charset="0"/>
+              <a:ea typeface="Calibri" panose="020F0502020204030204" pitchFamily="34" charset="0"/>
+              <a:cs typeface="Times New Roman" panose="02020603050405020304" pitchFamily="18" charset="0"/>
+            </a:endParaRPr>
+          </a:p>
+          <a:p>
+            <a:pPr marL="0" marR="0">
+              <a:lnSpc>
+                <a:spcPts val="2400"/>
+              </a:lnSpc>
+              <a:spcBef>
+                <a:spcPts val="2400"/>
+              </a:spcBef>
+              <a:spcAft>
+                <a:spcPts val="0"/>
+              </a:spcAft>
+            </a:pPr>
+            <a:r>
+              <a:rPr lang="en-US" sz="1800" spc="-5">
+                <a:solidFill>
+                  <a:srgbClr val="292929"/>
+                </a:solidFill>
+                <a:effectLst/>
+                <a:latin typeface="Georgia" panose="02040502050405020303" pitchFamily="18" charset="0"/>
+                <a:ea typeface="Times New Roman" panose="02020603050405020304" pitchFamily="18" charset="0"/>
+                <a:cs typeface="Times New Roman" panose="02020603050405020304" pitchFamily="18" charset="0"/>
+              </a:rPr>
+              <a:t>So, as data showed that most vehicle accidents occur during good conditions with somehow property damages what is left is to create campaigns to enhance “awareness” of driving and… DO NOT DRINK &amp; DRIVE!</a:t>
+            </a:r>
+            <a:endParaRPr lang="en-US" sz="1800">
+              <a:effectLst/>
+              <a:latin typeface="Calibri" panose="020F0502020204030204" pitchFamily="34" charset="0"/>
+              <a:ea typeface="Calibri" panose="020F0502020204030204" pitchFamily="34" charset="0"/>
+              <a:cs typeface="Times New Roman" panose="02020603050405020304" pitchFamily="18" charset="0"/>
+            </a:endParaRPr>
+          </a:p>
+        </p:txBody>
+      </p:sp>
     </p:spTree>
     <p:extLst>
       <p:ext uri="{BB962C8B-B14F-4D97-AF65-F5344CB8AC3E}">

</xml_diff>